<commit_message>
Liberación de habitación con detalles y factura
</commit_message>
<xml_diff>
--- a/doc/designs.pptx
+++ b/doc/designs.pptx
@@ -249,7 +249,7 @@
           <a:p>
             <a:fld id="{E7A5C674-113B-41BE-9C1B-98B312858AB3}" type="datetimeFigureOut">
               <a:rPr lang="es-CO" smtClean="0"/>
-              <a:t>6/01/2018</a:t>
+              <a:t>12/01/2018</a:t>
             </a:fld>
             <a:endParaRPr lang="es-CO"/>
           </a:p>
@@ -419,7 +419,7 @@
           <a:p>
             <a:fld id="{E7A5C674-113B-41BE-9C1B-98B312858AB3}" type="datetimeFigureOut">
               <a:rPr lang="es-CO" smtClean="0"/>
-              <a:t>6/01/2018</a:t>
+              <a:t>12/01/2018</a:t>
             </a:fld>
             <a:endParaRPr lang="es-CO"/>
           </a:p>
@@ -599,7 +599,7 @@
           <a:p>
             <a:fld id="{E7A5C674-113B-41BE-9C1B-98B312858AB3}" type="datetimeFigureOut">
               <a:rPr lang="es-CO" smtClean="0"/>
-              <a:t>6/01/2018</a:t>
+              <a:t>12/01/2018</a:t>
             </a:fld>
             <a:endParaRPr lang="es-CO"/>
           </a:p>
@@ -769,7 +769,7 @@
           <a:p>
             <a:fld id="{E7A5C674-113B-41BE-9C1B-98B312858AB3}" type="datetimeFigureOut">
               <a:rPr lang="es-CO" smtClean="0"/>
-              <a:t>6/01/2018</a:t>
+              <a:t>12/01/2018</a:t>
             </a:fld>
             <a:endParaRPr lang="es-CO"/>
           </a:p>
@@ -1015,7 +1015,7 @@
           <a:p>
             <a:fld id="{E7A5C674-113B-41BE-9C1B-98B312858AB3}" type="datetimeFigureOut">
               <a:rPr lang="es-CO" smtClean="0"/>
-              <a:t>6/01/2018</a:t>
+              <a:t>12/01/2018</a:t>
             </a:fld>
             <a:endParaRPr lang="es-CO"/>
           </a:p>
@@ -1247,7 +1247,7 @@
           <a:p>
             <a:fld id="{E7A5C674-113B-41BE-9C1B-98B312858AB3}" type="datetimeFigureOut">
               <a:rPr lang="es-CO" smtClean="0"/>
-              <a:t>6/01/2018</a:t>
+              <a:t>12/01/2018</a:t>
             </a:fld>
             <a:endParaRPr lang="es-CO"/>
           </a:p>
@@ -1614,7 +1614,7 @@
           <a:p>
             <a:fld id="{E7A5C674-113B-41BE-9C1B-98B312858AB3}" type="datetimeFigureOut">
               <a:rPr lang="es-CO" smtClean="0"/>
-              <a:t>6/01/2018</a:t>
+              <a:t>12/01/2018</a:t>
             </a:fld>
             <a:endParaRPr lang="es-CO"/>
           </a:p>
@@ -1732,7 +1732,7 @@
           <a:p>
             <a:fld id="{E7A5C674-113B-41BE-9C1B-98B312858AB3}" type="datetimeFigureOut">
               <a:rPr lang="es-CO" smtClean="0"/>
-              <a:t>6/01/2018</a:t>
+              <a:t>12/01/2018</a:t>
             </a:fld>
             <a:endParaRPr lang="es-CO"/>
           </a:p>
@@ -1827,7 +1827,7 @@
           <a:p>
             <a:fld id="{E7A5C674-113B-41BE-9C1B-98B312858AB3}" type="datetimeFigureOut">
               <a:rPr lang="es-CO" smtClean="0"/>
-              <a:t>6/01/2018</a:t>
+              <a:t>12/01/2018</a:t>
             </a:fld>
             <a:endParaRPr lang="es-CO"/>
           </a:p>
@@ -2104,7 +2104,7 @@
           <a:p>
             <a:fld id="{E7A5C674-113B-41BE-9C1B-98B312858AB3}" type="datetimeFigureOut">
               <a:rPr lang="es-CO" smtClean="0"/>
-              <a:t>6/01/2018</a:t>
+              <a:t>12/01/2018</a:t>
             </a:fld>
             <a:endParaRPr lang="es-CO"/>
           </a:p>
@@ -2357,7 +2357,7 @@
           <a:p>
             <a:fld id="{E7A5C674-113B-41BE-9C1B-98B312858AB3}" type="datetimeFigureOut">
               <a:rPr lang="es-CO" smtClean="0"/>
-              <a:t>6/01/2018</a:t>
+              <a:t>12/01/2018</a:t>
             </a:fld>
             <a:endParaRPr lang="es-CO"/>
           </a:p>
@@ -2570,7 +2570,7 @@
           <a:p>
             <a:fld id="{E7A5C674-113B-41BE-9C1B-98B312858AB3}" type="datetimeFigureOut">
               <a:rPr lang="es-CO" smtClean="0"/>
-              <a:t>6/01/2018</a:t>
+              <a:t>12/01/2018</a:t>
             </a:fld>
             <a:endParaRPr lang="es-CO"/>
           </a:p>
@@ -5693,6 +5693,78 @@
           </a:extLst>
         </p:spPr>
       </p:pic>
+      <p:pic>
+        <p:nvPicPr>
+          <p:cNvPr id="10" name="Imagen 9"/>
+          <p:cNvPicPr>
+            <a:picLocks noChangeAspect="1"/>
+          </p:cNvPicPr>
+          <p:nvPr/>
+        </p:nvPicPr>
+        <p:blipFill>
+          <a:blip r:embed="rId23"/>
+          <a:stretch>
+            <a:fillRect/>
+          </a:stretch>
+        </p:blipFill>
+        <p:spPr>
+          <a:xfrm>
+            <a:off x="4594019" y="3800318"/>
+            <a:ext cx="552381" cy="457143"/>
+          </a:xfrm>
+          <a:prstGeom prst="rect">
+            <a:avLst/>
+          </a:prstGeom>
+        </p:spPr>
+      </p:pic>
+      <p:sp>
+        <p:nvSpPr>
+          <p:cNvPr id="11" name="Triángulo isósceles 10"/>
+          <p:cNvSpPr/>
+          <p:nvPr/>
+        </p:nvSpPr>
+        <p:spPr>
+          <a:xfrm rot="5400000">
+            <a:off x="4759388" y="3949766"/>
+            <a:ext cx="169864" cy="90360"/>
+          </a:xfrm>
+          <a:prstGeom prst="triangle">
+            <a:avLst>
+              <a:gd name="adj" fmla="val 46501"/>
+            </a:avLst>
+          </a:prstGeom>
+          <a:solidFill>
+            <a:srgbClr val="21477E"/>
+          </a:solidFill>
+          <a:ln>
+            <a:noFill/>
+          </a:ln>
+        </p:spPr>
+        <p:style>
+          <a:lnRef idx="2">
+            <a:schemeClr val="accent1">
+              <a:shade val="50000"/>
+            </a:schemeClr>
+          </a:lnRef>
+          <a:fillRef idx="1">
+            <a:schemeClr val="accent1"/>
+          </a:fillRef>
+          <a:effectRef idx="0">
+            <a:schemeClr val="accent1"/>
+          </a:effectRef>
+          <a:fontRef idx="minor">
+            <a:schemeClr val="lt1"/>
+          </a:fontRef>
+        </p:style>
+        <p:txBody>
+          <a:bodyPr rtlCol="0" anchor="ctr"/>
+          <a:lstStyle/>
+          <a:p>
+            <a:pPr algn="ctr"/>
+            <a:endParaRPr lang="es-CO"/>
+          </a:p>
+        </p:txBody>
+      </p:sp>
     </p:spTree>
     <p:extLst>
       <p:ext uri="{BB962C8B-B14F-4D97-AF65-F5344CB8AC3E}">

</xml_diff>

<commit_message>
Primera entrega a PDN
</commit_message>
<xml_diff>
--- a/doc/designs.pptx
+++ b/doc/designs.pptx
@@ -249,7 +249,7 @@
           <a:p>
             <a:fld id="{E7A5C674-113B-41BE-9C1B-98B312858AB3}" type="datetimeFigureOut">
               <a:rPr lang="es-CO" smtClean="0"/>
-              <a:t>22/01/2018</a:t>
+              <a:t>6/01/2018</a:t>
             </a:fld>
             <a:endParaRPr lang="es-CO"/>
           </a:p>
@@ -419,7 +419,7 @@
           <a:p>
             <a:fld id="{E7A5C674-113B-41BE-9C1B-98B312858AB3}" type="datetimeFigureOut">
               <a:rPr lang="es-CO" smtClean="0"/>
-              <a:t>22/01/2018</a:t>
+              <a:t>6/01/2018</a:t>
             </a:fld>
             <a:endParaRPr lang="es-CO"/>
           </a:p>
@@ -599,7 +599,7 @@
           <a:p>
             <a:fld id="{E7A5C674-113B-41BE-9C1B-98B312858AB3}" type="datetimeFigureOut">
               <a:rPr lang="es-CO" smtClean="0"/>
-              <a:t>22/01/2018</a:t>
+              <a:t>6/01/2018</a:t>
             </a:fld>
             <a:endParaRPr lang="es-CO"/>
           </a:p>
@@ -769,7 +769,7 @@
           <a:p>
             <a:fld id="{E7A5C674-113B-41BE-9C1B-98B312858AB3}" type="datetimeFigureOut">
               <a:rPr lang="es-CO" smtClean="0"/>
-              <a:t>22/01/2018</a:t>
+              <a:t>6/01/2018</a:t>
             </a:fld>
             <a:endParaRPr lang="es-CO"/>
           </a:p>
@@ -1015,7 +1015,7 @@
           <a:p>
             <a:fld id="{E7A5C674-113B-41BE-9C1B-98B312858AB3}" type="datetimeFigureOut">
               <a:rPr lang="es-CO" smtClean="0"/>
-              <a:t>22/01/2018</a:t>
+              <a:t>6/01/2018</a:t>
             </a:fld>
             <a:endParaRPr lang="es-CO"/>
           </a:p>
@@ -1247,7 +1247,7 @@
           <a:p>
             <a:fld id="{E7A5C674-113B-41BE-9C1B-98B312858AB3}" type="datetimeFigureOut">
               <a:rPr lang="es-CO" smtClean="0"/>
-              <a:t>22/01/2018</a:t>
+              <a:t>6/01/2018</a:t>
             </a:fld>
             <a:endParaRPr lang="es-CO"/>
           </a:p>
@@ -1614,7 +1614,7 @@
           <a:p>
             <a:fld id="{E7A5C674-113B-41BE-9C1B-98B312858AB3}" type="datetimeFigureOut">
               <a:rPr lang="es-CO" smtClean="0"/>
-              <a:t>22/01/2018</a:t>
+              <a:t>6/01/2018</a:t>
             </a:fld>
             <a:endParaRPr lang="es-CO"/>
           </a:p>
@@ -1732,7 +1732,7 @@
           <a:p>
             <a:fld id="{E7A5C674-113B-41BE-9C1B-98B312858AB3}" type="datetimeFigureOut">
               <a:rPr lang="es-CO" smtClean="0"/>
-              <a:t>22/01/2018</a:t>
+              <a:t>6/01/2018</a:t>
             </a:fld>
             <a:endParaRPr lang="es-CO"/>
           </a:p>
@@ -1827,7 +1827,7 @@
           <a:p>
             <a:fld id="{E7A5C674-113B-41BE-9C1B-98B312858AB3}" type="datetimeFigureOut">
               <a:rPr lang="es-CO" smtClean="0"/>
-              <a:t>22/01/2018</a:t>
+              <a:t>6/01/2018</a:t>
             </a:fld>
             <a:endParaRPr lang="es-CO"/>
           </a:p>
@@ -2104,7 +2104,7 @@
           <a:p>
             <a:fld id="{E7A5C674-113B-41BE-9C1B-98B312858AB3}" type="datetimeFigureOut">
               <a:rPr lang="es-CO" smtClean="0"/>
-              <a:t>22/01/2018</a:t>
+              <a:t>6/01/2018</a:t>
             </a:fld>
             <a:endParaRPr lang="es-CO"/>
           </a:p>
@@ -2357,7 +2357,7 @@
           <a:p>
             <a:fld id="{E7A5C674-113B-41BE-9C1B-98B312858AB3}" type="datetimeFigureOut">
               <a:rPr lang="es-CO" smtClean="0"/>
-              <a:t>22/01/2018</a:t>
+              <a:t>6/01/2018</a:t>
             </a:fld>
             <a:endParaRPr lang="es-CO"/>
           </a:p>
@@ -2570,7 +2570,7 @@
           <a:p>
             <a:fld id="{E7A5C674-113B-41BE-9C1B-98B312858AB3}" type="datetimeFigureOut">
               <a:rPr lang="es-CO" smtClean="0"/>
-              <a:t>22/01/2018</a:t>
+              <a:t>6/01/2018</a:t>
             </a:fld>
             <a:endParaRPr lang="es-CO"/>
           </a:p>
@@ -5676,216 +5676,6 @@
         <p:spPr bwMode="auto">
           <a:xfrm>
             <a:off x="4053485" y="5782204"/>
-            <a:ext cx="399634" cy="399634"/>
-          </a:xfrm>
-          <a:prstGeom prst="rect">
-            <a:avLst/>
-          </a:prstGeom>
-          <a:noFill/>
-          <a:extLst>
-            <a:ext uri="{909E8E84-426E-40DD-AFC4-6F175D3DCCD1}">
-              <a14:hiddenFill xmlns:a14="http://schemas.microsoft.com/office/drawing/2010/main">
-                <a:solidFill>
-                  <a:srgbClr val="FFFFFF"/>
-                </a:solidFill>
-              </a14:hiddenFill>
-            </a:ext>
-          </a:extLst>
-        </p:spPr>
-      </p:pic>
-      <p:pic>
-        <p:nvPicPr>
-          <p:cNvPr id="10" name="Imagen 9"/>
-          <p:cNvPicPr>
-            <a:picLocks noChangeAspect="1"/>
-          </p:cNvPicPr>
-          <p:nvPr/>
-        </p:nvPicPr>
-        <p:blipFill>
-          <a:blip r:embed="rId23"/>
-          <a:stretch>
-            <a:fillRect/>
-          </a:stretch>
-        </p:blipFill>
-        <p:spPr>
-          <a:xfrm>
-            <a:off x="4594019" y="3800318"/>
-            <a:ext cx="552381" cy="457143"/>
-          </a:xfrm>
-          <a:prstGeom prst="rect">
-            <a:avLst/>
-          </a:prstGeom>
-        </p:spPr>
-      </p:pic>
-      <p:sp>
-        <p:nvSpPr>
-          <p:cNvPr id="11" name="Triángulo isósceles 10"/>
-          <p:cNvSpPr/>
-          <p:nvPr/>
-        </p:nvSpPr>
-        <p:spPr>
-          <a:xfrm rot="5400000">
-            <a:off x="4759388" y="3949766"/>
-            <a:ext cx="169864" cy="90360"/>
-          </a:xfrm>
-          <a:prstGeom prst="triangle">
-            <a:avLst>
-              <a:gd name="adj" fmla="val 46501"/>
-            </a:avLst>
-          </a:prstGeom>
-          <a:solidFill>
-            <a:srgbClr val="21477E"/>
-          </a:solidFill>
-          <a:ln>
-            <a:noFill/>
-          </a:ln>
-        </p:spPr>
-        <p:style>
-          <a:lnRef idx="2">
-            <a:schemeClr val="accent1">
-              <a:shade val="50000"/>
-            </a:schemeClr>
-          </a:lnRef>
-          <a:fillRef idx="1">
-            <a:schemeClr val="accent1"/>
-          </a:fillRef>
-          <a:effectRef idx="0">
-            <a:schemeClr val="accent1"/>
-          </a:effectRef>
-          <a:fontRef idx="minor">
-            <a:schemeClr val="lt1"/>
-          </a:fontRef>
-        </p:style>
-        <p:txBody>
-          <a:bodyPr rtlCol="0" anchor="ctr"/>
-          <a:lstStyle/>
-          <a:p>
-            <a:pPr algn="ctr"/>
-            <a:endParaRPr lang="es-CO"/>
-          </a:p>
-        </p:txBody>
-      </p:sp>
-      <p:sp>
-        <p:nvSpPr>
-          <p:cNvPr id="32" name="Rectángulo 31"/>
-          <p:cNvSpPr/>
-          <p:nvPr/>
-        </p:nvSpPr>
-        <p:spPr>
-          <a:xfrm>
-            <a:off x="4073149" y="5151966"/>
-            <a:ext cx="2062774" cy="396338"/>
-          </a:xfrm>
-          <a:prstGeom prst="rect">
-            <a:avLst/>
-          </a:prstGeom>
-          <a:solidFill>
-            <a:srgbClr val="FFFF00"/>
-          </a:solidFill>
-          <a:ln w="28575">
-            <a:solidFill>
-              <a:schemeClr val="tx1"/>
-            </a:solidFill>
-          </a:ln>
-        </p:spPr>
-        <p:style>
-          <a:lnRef idx="2">
-            <a:schemeClr val="accent4">
-              <a:shade val="50000"/>
-            </a:schemeClr>
-          </a:lnRef>
-          <a:fillRef idx="1">
-            <a:schemeClr val="accent4"/>
-          </a:fillRef>
-          <a:effectRef idx="0">
-            <a:schemeClr val="accent4"/>
-          </a:effectRef>
-          <a:fontRef idx="minor">
-            <a:schemeClr val="lt1"/>
-          </a:fontRef>
-        </p:style>
-        <p:txBody>
-          <a:bodyPr rtlCol="0" anchor="ctr"/>
-          <a:lstStyle/>
-          <a:p>
-            <a:pPr algn="ctr"/>
-            <a:endParaRPr lang="es-CO" sz="900" dirty="0">
-              <a:latin typeface="Arial Black" panose="020B0A04020102020204" pitchFamily="34" charset="0"/>
-            </a:endParaRPr>
-          </a:p>
-        </p:txBody>
-      </p:sp>
-      <p:sp>
-        <p:nvSpPr>
-          <p:cNvPr id="35" name="CuadroTexto 34"/>
-          <p:cNvSpPr txBox="1"/>
-          <p:nvPr/>
-        </p:nvSpPr>
-        <p:spPr>
-          <a:xfrm>
-            <a:off x="4402555" y="5179225"/>
-            <a:ext cx="1950168" cy="338554"/>
-          </a:xfrm>
-          <a:prstGeom prst="rect">
-            <a:avLst/>
-          </a:prstGeom>
-          <a:noFill/>
-        </p:spPr>
-        <p:txBody>
-          <a:bodyPr wrap="square" rtlCol="0">
-            <a:spAutoFit/>
-          </a:bodyPr>
-          <a:lstStyle/>
-          <a:p>
-            <a:r>
-              <a:rPr lang="es-CO" sz="1600" b="1" dirty="0" smtClean="0"/>
-              <a:t>ACABAR</a:t>
-            </a:r>
-            <a:r>
-              <a:rPr lang="es-CO" sz="1600" b="1" dirty="0" smtClean="0"/>
-              <a:t> </a:t>
-            </a:r>
-            <a:r>
-              <a:rPr lang="es-CO" sz="1600" b="1" dirty="0" smtClean="0"/>
-              <a:t>LIMPIEZA</a:t>
-            </a:r>
-            <a:endParaRPr lang="es-CO" sz="1600" b="1" dirty="0"/>
-          </a:p>
-        </p:txBody>
-      </p:sp>
-      <p:pic>
-        <p:nvPicPr>
-          <p:cNvPr id="36" name="Picture 2" descr="Resultado de imagen para clean icon"/>
-          <p:cNvPicPr>
-            <a:picLocks noChangeAspect="1" noChangeArrowheads="1"/>
-          </p:cNvPicPr>
-          <p:nvPr/>
-        </p:nvPicPr>
-        <p:blipFill>
-          <a:blip r:embed="rId21" cstate="print">
-            <a:extLst>
-              <a:ext uri="{BEBA8EAE-BF5A-486C-A8C5-ECC9F3942E4B}">
-                <a14:imgProps xmlns:a14="http://schemas.microsoft.com/office/drawing/2010/main">
-                  <a14:imgLayer r:embed="rId22">
-                    <a14:imgEffect>
-                      <a14:brightnessContrast bright="-40000" contrast="-40000"/>
-                    </a14:imgEffect>
-                  </a14:imgLayer>
-                </a14:imgProps>
-              </a:ext>
-              <a:ext uri="{28A0092B-C50C-407E-A947-70E740481C1C}">
-                <a14:useLocalDpi xmlns:a14="http://schemas.microsoft.com/office/drawing/2010/main" val="0"/>
-              </a:ext>
-            </a:extLst>
-          </a:blip>
-          <a:srcRect/>
-          <a:stretch>
-            <a:fillRect/>
-          </a:stretch>
-        </p:blipFill>
-        <p:spPr bwMode="auto">
-          <a:xfrm>
-            <a:off x="4065450" y="5148670"/>
             <a:ext cx="399634" cy="399634"/>
           </a:xfrm>
           <a:prstGeom prst="rect">

</xml_diff>

<commit_message>
Invetario unico general, filtrado de productos, mejoras en la liberación de habitaciones
</commit_message>
<xml_diff>
--- a/doc/designs.pptx
+++ b/doc/designs.pptx
@@ -12,6 +12,7 @@
     <p:sldId id="260" r:id="rId6"/>
     <p:sldId id="262" r:id="rId7"/>
     <p:sldId id="261" r:id="rId8"/>
+    <p:sldId id="263" r:id="rId9"/>
   </p:sldIdLst>
   <p:sldSz cx="12192000" cy="6858000"/>
   <p:notesSz cx="6858000" cy="9144000"/>
@@ -249,7 +250,7 @@
           <a:p>
             <a:fld id="{E7A5C674-113B-41BE-9C1B-98B312858AB3}" type="datetimeFigureOut">
               <a:rPr lang="es-CO" smtClean="0"/>
-              <a:t>6/01/2018</a:t>
+              <a:t>11/02/2018</a:t>
             </a:fld>
             <a:endParaRPr lang="es-CO"/>
           </a:p>
@@ -419,7 +420,7 @@
           <a:p>
             <a:fld id="{E7A5C674-113B-41BE-9C1B-98B312858AB3}" type="datetimeFigureOut">
               <a:rPr lang="es-CO" smtClean="0"/>
-              <a:t>6/01/2018</a:t>
+              <a:t>11/02/2018</a:t>
             </a:fld>
             <a:endParaRPr lang="es-CO"/>
           </a:p>
@@ -599,7 +600,7 @@
           <a:p>
             <a:fld id="{E7A5C674-113B-41BE-9C1B-98B312858AB3}" type="datetimeFigureOut">
               <a:rPr lang="es-CO" smtClean="0"/>
-              <a:t>6/01/2018</a:t>
+              <a:t>11/02/2018</a:t>
             </a:fld>
             <a:endParaRPr lang="es-CO"/>
           </a:p>
@@ -769,7 +770,7 @@
           <a:p>
             <a:fld id="{E7A5C674-113B-41BE-9C1B-98B312858AB3}" type="datetimeFigureOut">
               <a:rPr lang="es-CO" smtClean="0"/>
-              <a:t>6/01/2018</a:t>
+              <a:t>11/02/2018</a:t>
             </a:fld>
             <a:endParaRPr lang="es-CO"/>
           </a:p>
@@ -1015,7 +1016,7 @@
           <a:p>
             <a:fld id="{E7A5C674-113B-41BE-9C1B-98B312858AB3}" type="datetimeFigureOut">
               <a:rPr lang="es-CO" smtClean="0"/>
-              <a:t>6/01/2018</a:t>
+              <a:t>11/02/2018</a:t>
             </a:fld>
             <a:endParaRPr lang="es-CO"/>
           </a:p>
@@ -1247,7 +1248,7 @@
           <a:p>
             <a:fld id="{E7A5C674-113B-41BE-9C1B-98B312858AB3}" type="datetimeFigureOut">
               <a:rPr lang="es-CO" smtClean="0"/>
-              <a:t>6/01/2018</a:t>
+              <a:t>11/02/2018</a:t>
             </a:fld>
             <a:endParaRPr lang="es-CO"/>
           </a:p>
@@ -1614,7 +1615,7 @@
           <a:p>
             <a:fld id="{E7A5C674-113B-41BE-9C1B-98B312858AB3}" type="datetimeFigureOut">
               <a:rPr lang="es-CO" smtClean="0"/>
-              <a:t>6/01/2018</a:t>
+              <a:t>11/02/2018</a:t>
             </a:fld>
             <a:endParaRPr lang="es-CO"/>
           </a:p>
@@ -1732,7 +1733,7 @@
           <a:p>
             <a:fld id="{E7A5C674-113B-41BE-9C1B-98B312858AB3}" type="datetimeFigureOut">
               <a:rPr lang="es-CO" smtClean="0"/>
-              <a:t>6/01/2018</a:t>
+              <a:t>11/02/2018</a:t>
             </a:fld>
             <a:endParaRPr lang="es-CO"/>
           </a:p>
@@ -1827,7 +1828,7 @@
           <a:p>
             <a:fld id="{E7A5C674-113B-41BE-9C1B-98B312858AB3}" type="datetimeFigureOut">
               <a:rPr lang="es-CO" smtClean="0"/>
-              <a:t>6/01/2018</a:t>
+              <a:t>11/02/2018</a:t>
             </a:fld>
             <a:endParaRPr lang="es-CO"/>
           </a:p>
@@ -2104,7 +2105,7 @@
           <a:p>
             <a:fld id="{E7A5C674-113B-41BE-9C1B-98B312858AB3}" type="datetimeFigureOut">
               <a:rPr lang="es-CO" smtClean="0"/>
-              <a:t>6/01/2018</a:t>
+              <a:t>11/02/2018</a:t>
             </a:fld>
             <a:endParaRPr lang="es-CO"/>
           </a:p>
@@ -2357,7 +2358,7 @@
           <a:p>
             <a:fld id="{E7A5C674-113B-41BE-9C1B-98B312858AB3}" type="datetimeFigureOut">
               <a:rPr lang="es-CO" smtClean="0"/>
-              <a:t>6/01/2018</a:t>
+              <a:t>11/02/2018</a:t>
             </a:fld>
             <a:endParaRPr lang="es-CO"/>
           </a:p>
@@ -2570,7 +2571,7 @@
           <a:p>
             <a:fld id="{E7A5C674-113B-41BE-9C1B-98B312858AB3}" type="datetimeFigureOut">
               <a:rPr lang="es-CO" smtClean="0"/>
-              <a:t>6/01/2018</a:t>
+              <a:t>11/02/2018</a:t>
             </a:fld>
             <a:endParaRPr lang="es-CO"/>
           </a:p>
@@ -6632,6 +6633,269 @@
 </p:sld>
 </file>
 
+<file path=ppt/slides/slide8.xml><?xml version="1.0" encoding="utf-8"?>
+<p:sld xmlns:a="http://schemas.openxmlformats.org/drawingml/2006/main" xmlns:r="http://schemas.openxmlformats.org/officeDocument/2006/relationships" xmlns:p="http://schemas.openxmlformats.org/presentationml/2006/main">
+  <p:cSld>
+    <p:bg>
+      <p:bgPr>
+        <a:solidFill>
+          <a:srgbClr val="EFEBE7"/>
+        </a:solidFill>
+        <a:effectLst/>
+      </p:bgPr>
+    </p:bg>
+    <p:spTree>
+      <p:nvGrpSpPr>
+        <p:cNvPr id="1" name=""/>
+        <p:cNvGrpSpPr/>
+        <p:nvPr/>
+      </p:nvGrpSpPr>
+      <p:grpSpPr>
+        <a:xfrm>
+          <a:off x="0" y="0"/>
+          <a:ext cx="0" cy="0"/>
+          <a:chOff x="0" y="0"/>
+          <a:chExt cx="0" cy="0"/>
+        </a:xfrm>
+      </p:grpSpPr>
+      <p:sp>
+        <p:nvSpPr>
+          <p:cNvPr id="6" name="Rectángulo 5"/>
+          <p:cNvSpPr/>
+          <p:nvPr/>
+        </p:nvSpPr>
+        <p:spPr>
+          <a:xfrm>
+            <a:off x="3107780" y="2815680"/>
+            <a:ext cx="180000" cy="180000"/>
+          </a:xfrm>
+          <a:prstGeom prst="rect">
+            <a:avLst/>
+          </a:prstGeom>
+          <a:noFill/>
+          <a:ln w="6350">
+            <a:solidFill>
+              <a:srgbClr val="303030"/>
+            </a:solidFill>
+          </a:ln>
+        </p:spPr>
+        <p:style>
+          <a:lnRef idx="2">
+            <a:schemeClr val="accent1">
+              <a:shade val="50000"/>
+            </a:schemeClr>
+          </a:lnRef>
+          <a:fillRef idx="1">
+            <a:schemeClr val="accent1"/>
+          </a:fillRef>
+          <a:effectRef idx="0">
+            <a:schemeClr val="accent1"/>
+          </a:effectRef>
+          <a:fontRef idx="minor">
+            <a:schemeClr val="lt1"/>
+          </a:fontRef>
+        </p:style>
+        <p:txBody>
+          <a:bodyPr rtlCol="0" anchor="ctr"/>
+          <a:lstStyle/>
+          <a:p>
+            <a:pPr algn="ctr"/>
+            <a:endParaRPr lang="es-CO"/>
+          </a:p>
+        </p:txBody>
+      </p:sp>
+      <p:pic>
+        <p:nvPicPr>
+          <p:cNvPr id="1026" name="Picture 2" descr="Refresh icon"/>
+          <p:cNvPicPr>
+            <a:picLocks noChangeAspect="1" noChangeArrowheads="1"/>
+          </p:cNvPicPr>
+          <p:nvPr/>
+        </p:nvPicPr>
+        <p:blipFill>
+          <a:blip r:embed="rId2">
+            <a:extLst>
+              <a:ext uri="{28A0092B-C50C-407E-A947-70E740481C1C}">
+                <a14:useLocalDpi xmlns:a14="http://schemas.microsoft.com/office/drawing/2010/main" val="0"/>
+              </a:ext>
+            </a:extLst>
+          </a:blip>
+          <a:srcRect/>
+          <a:stretch>
+            <a:fillRect/>
+          </a:stretch>
+        </p:blipFill>
+        <p:spPr bwMode="auto">
+          <a:xfrm>
+            <a:off x="3123656" y="2837906"/>
+            <a:ext cx="152400" cy="152400"/>
+          </a:xfrm>
+          <a:prstGeom prst="rect">
+            <a:avLst/>
+          </a:prstGeom>
+          <a:noFill/>
+          <a:extLst>
+            <a:ext uri="{909E8E84-426E-40DD-AFC4-6F175D3DCCD1}">
+              <a14:hiddenFill xmlns:a14="http://schemas.microsoft.com/office/drawing/2010/main">
+                <a:solidFill>
+                  <a:srgbClr val="FFFFFF"/>
+                </a:solidFill>
+              </a14:hiddenFill>
+            </a:ext>
+          </a:extLst>
+        </p:spPr>
+      </p:pic>
+      <p:pic>
+        <p:nvPicPr>
+          <p:cNvPr id="1028" name="Picture 4" descr="Refresh icon"/>
+          <p:cNvPicPr>
+            <a:picLocks noChangeAspect="1" noChangeArrowheads="1"/>
+          </p:cNvPicPr>
+          <p:nvPr/>
+        </p:nvPicPr>
+        <p:blipFill>
+          <a:blip r:embed="rId3">
+            <a:extLst>
+              <a:ext uri="{28A0092B-C50C-407E-A947-70E740481C1C}">
+                <a14:useLocalDpi xmlns:a14="http://schemas.microsoft.com/office/drawing/2010/main" val="0"/>
+              </a:ext>
+            </a:extLst>
+          </a:blip>
+          <a:srcRect/>
+          <a:stretch>
+            <a:fillRect/>
+          </a:stretch>
+        </p:blipFill>
+        <p:spPr bwMode="auto">
+          <a:xfrm>
+            <a:off x="1409609" y="2306229"/>
+            <a:ext cx="228600" cy="228600"/>
+          </a:xfrm>
+          <a:prstGeom prst="rect">
+            <a:avLst/>
+          </a:prstGeom>
+          <a:noFill/>
+          <a:extLst>
+            <a:ext uri="{909E8E84-426E-40DD-AFC4-6F175D3DCCD1}">
+              <a14:hiddenFill xmlns:a14="http://schemas.microsoft.com/office/drawing/2010/main">
+                <a:solidFill>
+                  <a:srgbClr val="FFFFFF"/>
+                </a:solidFill>
+              </a14:hiddenFill>
+            </a:ext>
+          </a:extLst>
+        </p:spPr>
+      </p:pic>
+      <p:pic>
+        <p:nvPicPr>
+          <p:cNvPr id="8" name="Picture 4" descr="Refresh icon"/>
+          <p:cNvPicPr>
+            <a:picLocks noChangeAspect="1" noChangeArrowheads="1"/>
+          </p:cNvPicPr>
+          <p:nvPr/>
+        </p:nvPicPr>
+        <p:blipFill>
+          <a:blip r:embed="rId3">
+            <a:extLst>
+              <a:ext uri="{28A0092B-C50C-407E-A947-70E740481C1C}">
+                <a14:useLocalDpi xmlns:a14="http://schemas.microsoft.com/office/drawing/2010/main" val="0"/>
+              </a:ext>
+            </a:extLst>
+          </a:blip>
+          <a:srcRect/>
+          <a:stretch>
+            <a:fillRect/>
+          </a:stretch>
+        </p:blipFill>
+        <p:spPr bwMode="auto">
+          <a:xfrm>
+            <a:off x="1181009" y="3126197"/>
+            <a:ext cx="228600" cy="228600"/>
+          </a:xfrm>
+          <a:prstGeom prst="rect">
+            <a:avLst/>
+          </a:prstGeom>
+          <a:noFill/>
+          <a:ln>
+            <a:noFill/>
+          </a:ln>
+          <a:extLst>
+            <a:ext uri="{909E8E84-426E-40DD-AFC4-6F175D3DCCD1}">
+              <a14:hiddenFill xmlns:a14="http://schemas.microsoft.com/office/drawing/2010/main">
+                <a:solidFill>
+                  <a:srgbClr val="FFFFFF"/>
+                </a:solidFill>
+              </a14:hiddenFill>
+            </a:ext>
+          </a:extLst>
+        </p:spPr>
+      </p:pic>
+      <p:sp>
+        <p:nvSpPr>
+          <p:cNvPr id="9" name="Rectángulo 8"/>
+          <p:cNvSpPr/>
+          <p:nvPr/>
+        </p:nvSpPr>
+        <p:spPr>
+          <a:xfrm>
+            <a:off x="981074" y="3455193"/>
+            <a:ext cx="252000" cy="252000"/>
+          </a:xfrm>
+          <a:prstGeom prst="rect">
+            <a:avLst/>
+          </a:prstGeom>
+          <a:noFill/>
+          <a:ln w="6350">
+            <a:solidFill>
+              <a:srgbClr val="303030"/>
+            </a:solidFill>
+          </a:ln>
+        </p:spPr>
+        <p:style>
+          <a:lnRef idx="2">
+            <a:schemeClr val="accent1">
+              <a:shade val="50000"/>
+            </a:schemeClr>
+          </a:lnRef>
+          <a:fillRef idx="1">
+            <a:schemeClr val="accent1"/>
+          </a:fillRef>
+          <a:effectRef idx="0">
+            <a:schemeClr val="accent1"/>
+          </a:effectRef>
+          <a:fontRef idx="minor">
+            <a:schemeClr val="lt1"/>
+          </a:fontRef>
+        </p:style>
+        <p:txBody>
+          <a:bodyPr rtlCol="0" anchor="ctr"/>
+          <a:lstStyle/>
+          <a:p>
+            <a:pPr algn="ctr"/>
+            <a:endParaRPr lang="es-CO"/>
+          </a:p>
+        </p:txBody>
+      </p:sp>
+    </p:spTree>
+    <p:extLst>
+      <p:ext uri="{BB962C8B-B14F-4D97-AF65-F5344CB8AC3E}">
+        <p14:creationId xmlns:p14="http://schemas.microsoft.com/office/powerpoint/2010/main" val="1112471617"/>
+      </p:ext>
+    </p:extLst>
+  </p:cSld>
+  <p:clrMapOvr>
+    <a:masterClrMapping/>
+  </p:clrMapOvr>
+  <p:timing>
+    <p:tnLst>
+      <p:par>
+        <p:cTn id="1" dur="indefinite" restart="never" nodeType="tmRoot"/>
+      </p:par>
+    </p:tnLst>
+  </p:timing>
+</p:sld>
+</file>
+
 <file path=ppt/theme/theme1.xml><?xml version="1.0" encoding="utf-8"?>
 <a:theme xmlns:a="http://schemas.openxmlformats.org/drawingml/2006/main" name="Tema de Office">
   <a:themeElements>

</xml_diff>

<commit_message>
Asignación de mantenimiento a las habitaciobes
</commit_message>
<xml_diff>
--- a/doc/designs.pptx
+++ b/doc/designs.pptx
@@ -9,10 +9,11 @@
     <p:sldId id="258" r:id="rId3"/>
     <p:sldId id="257" r:id="rId4"/>
     <p:sldId id="259" r:id="rId5"/>
-    <p:sldId id="260" r:id="rId6"/>
-    <p:sldId id="262" r:id="rId7"/>
-    <p:sldId id="261" r:id="rId8"/>
-    <p:sldId id="263" r:id="rId9"/>
+    <p:sldId id="264" r:id="rId6"/>
+    <p:sldId id="260" r:id="rId7"/>
+    <p:sldId id="262" r:id="rId8"/>
+    <p:sldId id="261" r:id="rId9"/>
+    <p:sldId id="263" r:id="rId10"/>
   </p:sldIdLst>
   <p:sldSz cx="12192000" cy="6858000"/>
   <p:notesSz cx="6858000" cy="9144000"/>
@@ -250,7 +251,7 @@
           <a:p>
             <a:fld id="{E7A5C674-113B-41BE-9C1B-98B312858AB3}" type="datetimeFigureOut">
               <a:rPr lang="es-CO" smtClean="0"/>
-              <a:t>11/02/2018</a:t>
+              <a:t>14/02/2018</a:t>
             </a:fld>
             <a:endParaRPr lang="es-CO"/>
           </a:p>
@@ -420,7 +421,7 @@
           <a:p>
             <a:fld id="{E7A5C674-113B-41BE-9C1B-98B312858AB3}" type="datetimeFigureOut">
               <a:rPr lang="es-CO" smtClean="0"/>
-              <a:t>11/02/2018</a:t>
+              <a:t>14/02/2018</a:t>
             </a:fld>
             <a:endParaRPr lang="es-CO"/>
           </a:p>
@@ -600,7 +601,7 @@
           <a:p>
             <a:fld id="{E7A5C674-113B-41BE-9C1B-98B312858AB3}" type="datetimeFigureOut">
               <a:rPr lang="es-CO" smtClean="0"/>
-              <a:t>11/02/2018</a:t>
+              <a:t>14/02/2018</a:t>
             </a:fld>
             <a:endParaRPr lang="es-CO"/>
           </a:p>
@@ -770,7 +771,7 @@
           <a:p>
             <a:fld id="{E7A5C674-113B-41BE-9C1B-98B312858AB3}" type="datetimeFigureOut">
               <a:rPr lang="es-CO" smtClean="0"/>
-              <a:t>11/02/2018</a:t>
+              <a:t>14/02/2018</a:t>
             </a:fld>
             <a:endParaRPr lang="es-CO"/>
           </a:p>
@@ -1016,7 +1017,7 @@
           <a:p>
             <a:fld id="{E7A5C674-113B-41BE-9C1B-98B312858AB3}" type="datetimeFigureOut">
               <a:rPr lang="es-CO" smtClean="0"/>
-              <a:t>11/02/2018</a:t>
+              <a:t>14/02/2018</a:t>
             </a:fld>
             <a:endParaRPr lang="es-CO"/>
           </a:p>
@@ -1248,7 +1249,7 @@
           <a:p>
             <a:fld id="{E7A5C674-113B-41BE-9C1B-98B312858AB3}" type="datetimeFigureOut">
               <a:rPr lang="es-CO" smtClean="0"/>
-              <a:t>11/02/2018</a:t>
+              <a:t>14/02/2018</a:t>
             </a:fld>
             <a:endParaRPr lang="es-CO"/>
           </a:p>
@@ -1615,7 +1616,7 @@
           <a:p>
             <a:fld id="{E7A5C674-113B-41BE-9C1B-98B312858AB3}" type="datetimeFigureOut">
               <a:rPr lang="es-CO" smtClean="0"/>
-              <a:t>11/02/2018</a:t>
+              <a:t>14/02/2018</a:t>
             </a:fld>
             <a:endParaRPr lang="es-CO"/>
           </a:p>
@@ -1733,7 +1734,7 @@
           <a:p>
             <a:fld id="{E7A5C674-113B-41BE-9C1B-98B312858AB3}" type="datetimeFigureOut">
               <a:rPr lang="es-CO" smtClean="0"/>
-              <a:t>11/02/2018</a:t>
+              <a:t>14/02/2018</a:t>
             </a:fld>
             <a:endParaRPr lang="es-CO"/>
           </a:p>
@@ -1828,7 +1829,7 @@
           <a:p>
             <a:fld id="{E7A5C674-113B-41BE-9C1B-98B312858AB3}" type="datetimeFigureOut">
               <a:rPr lang="es-CO" smtClean="0"/>
-              <a:t>11/02/2018</a:t>
+              <a:t>14/02/2018</a:t>
             </a:fld>
             <a:endParaRPr lang="es-CO"/>
           </a:p>
@@ -2105,7 +2106,7 @@
           <a:p>
             <a:fld id="{E7A5C674-113B-41BE-9C1B-98B312858AB3}" type="datetimeFigureOut">
               <a:rPr lang="es-CO" smtClean="0"/>
-              <a:t>11/02/2018</a:t>
+              <a:t>14/02/2018</a:t>
             </a:fld>
             <a:endParaRPr lang="es-CO"/>
           </a:p>
@@ -2358,7 +2359,7 @@
           <a:p>
             <a:fld id="{E7A5C674-113B-41BE-9C1B-98B312858AB3}" type="datetimeFigureOut">
               <a:rPr lang="es-CO" smtClean="0"/>
-              <a:t>11/02/2018</a:t>
+              <a:t>14/02/2018</a:t>
             </a:fld>
             <a:endParaRPr lang="es-CO"/>
           </a:p>
@@ -2571,7 +2572,7 @@
           <a:p>
             <a:fld id="{E7A5C674-113B-41BE-9C1B-98B312858AB3}" type="datetimeFigureOut">
               <a:rPr lang="es-CO" smtClean="0"/>
-              <a:t>11/02/2018</a:t>
+              <a:t>14/02/2018</a:t>
             </a:fld>
             <a:endParaRPr lang="es-CO"/>
           </a:p>
@@ -5694,6 +5695,407 @@
           </a:extLst>
         </p:spPr>
       </p:pic>
+      <p:sp>
+        <p:nvSpPr>
+          <p:cNvPr id="30" name="Rectángulo 29"/>
+          <p:cNvSpPr/>
+          <p:nvPr/>
+        </p:nvSpPr>
+        <p:spPr>
+          <a:xfrm>
+            <a:off x="6757860" y="5786322"/>
+            <a:ext cx="396000" cy="396000"/>
+          </a:xfrm>
+          <a:prstGeom prst="rect">
+            <a:avLst/>
+          </a:prstGeom>
+          <a:solidFill>
+            <a:srgbClr val="21477E"/>
+          </a:solidFill>
+          <a:ln w="28575">
+            <a:solidFill>
+              <a:schemeClr val="tx1"/>
+            </a:solidFill>
+          </a:ln>
+        </p:spPr>
+        <p:style>
+          <a:lnRef idx="2">
+            <a:schemeClr val="accent4">
+              <a:shade val="50000"/>
+            </a:schemeClr>
+          </a:lnRef>
+          <a:fillRef idx="1">
+            <a:schemeClr val="accent4"/>
+          </a:fillRef>
+          <a:effectRef idx="0">
+            <a:schemeClr val="accent4"/>
+          </a:effectRef>
+          <a:fontRef idx="minor">
+            <a:schemeClr val="lt1"/>
+          </a:fontRef>
+        </p:style>
+        <p:txBody>
+          <a:bodyPr rtlCol="0" anchor="ctr"/>
+          <a:lstStyle/>
+          <a:p>
+            <a:pPr algn="ctr"/>
+            <a:endParaRPr lang="es-CO" sz="900" dirty="0">
+              <a:latin typeface="Arial Black" panose="020B0A04020102020204" pitchFamily="34" charset="0"/>
+            </a:endParaRPr>
+          </a:p>
+        </p:txBody>
+      </p:sp>
+      <p:sp>
+        <p:nvSpPr>
+          <p:cNvPr id="37" name="Rectángulo 36"/>
+          <p:cNvSpPr/>
+          <p:nvPr/>
+        </p:nvSpPr>
+        <p:spPr>
+          <a:xfrm>
+            <a:off x="4150893" y="4141188"/>
+            <a:ext cx="1465198" cy="396338"/>
+          </a:xfrm>
+          <a:prstGeom prst="rect">
+            <a:avLst/>
+          </a:prstGeom>
+          <a:solidFill>
+            <a:srgbClr val="1C6E1C"/>
+          </a:solidFill>
+          <a:ln w="28575">
+            <a:solidFill>
+              <a:schemeClr val="tx1"/>
+            </a:solidFill>
+          </a:ln>
+        </p:spPr>
+        <p:style>
+          <a:lnRef idx="2">
+            <a:schemeClr val="accent4">
+              <a:shade val="50000"/>
+            </a:schemeClr>
+          </a:lnRef>
+          <a:fillRef idx="1">
+            <a:schemeClr val="accent4"/>
+          </a:fillRef>
+          <a:effectRef idx="0">
+            <a:schemeClr val="accent4"/>
+          </a:effectRef>
+          <a:fontRef idx="minor">
+            <a:schemeClr val="lt1"/>
+          </a:fontRef>
+        </p:style>
+        <p:txBody>
+          <a:bodyPr rtlCol="0" anchor="ctr"/>
+          <a:lstStyle/>
+          <a:p>
+            <a:pPr algn="ctr"/>
+            <a:endParaRPr lang="es-CO" sz="900" dirty="0">
+              <a:latin typeface="Arial Black" panose="020B0A04020102020204" pitchFamily="34" charset="0"/>
+            </a:endParaRPr>
+          </a:p>
+        </p:txBody>
+      </p:sp>
+      <p:sp>
+        <p:nvSpPr>
+          <p:cNvPr id="38" name="CuadroTexto 37"/>
+          <p:cNvSpPr txBox="1"/>
+          <p:nvPr/>
+        </p:nvSpPr>
+        <p:spPr>
+          <a:xfrm>
+            <a:off x="4538172" y="4130935"/>
+            <a:ext cx="1093961" cy="400110"/>
+          </a:xfrm>
+          <a:prstGeom prst="rect">
+            <a:avLst/>
+          </a:prstGeom>
+          <a:noFill/>
+        </p:spPr>
+        <p:txBody>
+          <a:bodyPr wrap="square" rtlCol="0">
+            <a:spAutoFit/>
+          </a:bodyPr>
+          <a:lstStyle/>
+          <a:p>
+            <a:r>
+              <a:rPr lang="es-CO" sz="2000" b="1" dirty="0" smtClean="0">
+                <a:solidFill>
+                  <a:schemeClr val="bg1"/>
+                </a:solidFill>
+              </a:rPr>
+              <a:t>LIBERAR</a:t>
+            </a:r>
+            <a:endParaRPr lang="es-CO" sz="2400" b="1" dirty="0">
+              <a:solidFill>
+                <a:schemeClr val="bg1"/>
+              </a:solidFill>
+            </a:endParaRPr>
+          </a:p>
+        </p:txBody>
+      </p:sp>
+      <p:pic>
+        <p:nvPicPr>
+          <p:cNvPr id="39" name="Picture 4" descr="Resultado de imagen para key icon png"/>
+          <p:cNvPicPr>
+            <a:picLocks noChangeAspect="1" noChangeArrowheads="1"/>
+          </p:cNvPicPr>
+          <p:nvPr/>
+        </p:nvPicPr>
+        <p:blipFill>
+          <a:blip r:embed="rId11" cstate="print">
+            <a:extLst>
+              <a:ext uri="{BEBA8EAE-BF5A-486C-A8C5-ECC9F3942E4B}">
+                <a14:imgProps xmlns:a14="http://schemas.microsoft.com/office/drawing/2010/main">
+                  <a14:imgLayer r:embed="rId12">
+                    <a14:imgEffect>
+                      <a14:brightnessContrast bright="100000"/>
+                    </a14:imgEffect>
+                  </a14:imgLayer>
+                </a14:imgProps>
+              </a:ext>
+              <a:ext uri="{28A0092B-C50C-407E-A947-70E740481C1C}">
+                <a14:useLocalDpi xmlns:a14="http://schemas.microsoft.com/office/drawing/2010/main" val="0"/>
+              </a:ext>
+            </a:extLst>
+          </a:blip>
+          <a:srcRect/>
+          <a:stretch>
+            <a:fillRect/>
+          </a:stretch>
+        </p:blipFill>
+        <p:spPr bwMode="auto">
+          <a:xfrm>
+            <a:off x="4206995" y="4183642"/>
+            <a:ext cx="358281" cy="342195"/>
+          </a:xfrm>
+          <a:prstGeom prst="rect">
+            <a:avLst/>
+          </a:prstGeom>
+          <a:noFill/>
+          <a:extLst>
+            <a:ext uri="{909E8E84-426E-40DD-AFC4-6F175D3DCCD1}">
+              <a14:hiddenFill xmlns:a14="http://schemas.microsoft.com/office/drawing/2010/main">
+                <a:solidFill>
+                  <a:srgbClr val="FFFFFF"/>
+                </a:solidFill>
+              </a14:hiddenFill>
+            </a:ext>
+          </a:extLst>
+        </p:spPr>
+      </p:pic>
+      <p:pic>
+        <p:nvPicPr>
+          <p:cNvPr id="9" name="Imagen 8"/>
+          <p:cNvPicPr>
+            <a:picLocks noChangeAspect="1"/>
+          </p:cNvPicPr>
+          <p:nvPr/>
+        </p:nvPicPr>
+        <p:blipFill>
+          <a:blip r:embed="rId23"/>
+          <a:stretch>
+            <a:fillRect/>
+          </a:stretch>
+        </p:blipFill>
+        <p:spPr>
+          <a:xfrm>
+            <a:off x="6941343" y="59752"/>
+            <a:ext cx="2981708" cy="3264643"/>
+          </a:xfrm>
+          <a:prstGeom prst="rect">
+            <a:avLst/>
+          </a:prstGeom>
+        </p:spPr>
+      </p:pic>
+      <p:sp>
+        <p:nvSpPr>
+          <p:cNvPr id="40" name="Rectángulo 39"/>
+          <p:cNvSpPr/>
+          <p:nvPr/>
+        </p:nvSpPr>
+        <p:spPr>
+          <a:xfrm>
+            <a:off x="9329052" y="2717587"/>
+            <a:ext cx="396000" cy="396000"/>
+          </a:xfrm>
+          <a:prstGeom prst="rect">
+            <a:avLst/>
+          </a:prstGeom>
+          <a:solidFill>
+            <a:srgbClr val="002060"/>
+          </a:solidFill>
+          <a:ln w="28575">
+            <a:solidFill>
+              <a:schemeClr val="tx1"/>
+            </a:solidFill>
+          </a:ln>
+        </p:spPr>
+        <p:style>
+          <a:lnRef idx="2">
+            <a:schemeClr val="accent4">
+              <a:shade val="50000"/>
+            </a:schemeClr>
+          </a:lnRef>
+          <a:fillRef idx="1">
+            <a:schemeClr val="accent4"/>
+          </a:fillRef>
+          <a:effectRef idx="0">
+            <a:schemeClr val="accent4"/>
+          </a:effectRef>
+          <a:fontRef idx="minor">
+            <a:schemeClr val="lt1"/>
+          </a:fontRef>
+        </p:style>
+        <p:txBody>
+          <a:bodyPr rtlCol="0" anchor="ctr"/>
+          <a:lstStyle/>
+          <a:p>
+            <a:pPr algn="ctr"/>
+            <a:endParaRPr lang="es-CO" sz="900" dirty="0">
+              <a:latin typeface="Arial Black" panose="020B0A04020102020204" pitchFamily="34" charset="0"/>
+            </a:endParaRPr>
+          </a:p>
+        </p:txBody>
+      </p:sp>
+      <p:sp>
+        <p:nvSpPr>
+          <p:cNvPr id="10" name="Cruz 9"/>
+          <p:cNvSpPr/>
+          <p:nvPr/>
+        </p:nvSpPr>
+        <p:spPr>
+          <a:xfrm>
+            <a:off x="6810267" y="5842471"/>
+            <a:ext cx="288000" cy="288000"/>
+          </a:xfrm>
+          <a:prstGeom prst="plus">
+            <a:avLst>
+              <a:gd name="adj" fmla="val 37143"/>
+            </a:avLst>
+          </a:prstGeom>
+          <a:solidFill>
+            <a:schemeClr val="bg1"/>
+          </a:solidFill>
+          <a:ln>
+            <a:noFill/>
+          </a:ln>
+        </p:spPr>
+        <p:style>
+          <a:lnRef idx="2">
+            <a:schemeClr val="accent1">
+              <a:shade val="50000"/>
+            </a:schemeClr>
+          </a:lnRef>
+          <a:fillRef idx="1">
+            <a:schemeClr val="accent1"/>
+          </a:fillRef>
+          <a:effectRef idx="0">
+            <a:schemeClr val="accent1"/>
+          </a:effectRef>
+          <a:fontRef idx="minor">
+            <a:schemeClr val="lt1"/>
+          </a:fontRef>
+        </p:style>
+        <p:txBody>
+          <a:bodyPr rtlCol="0" anchor="ctr"/>
+          <a:lstStyle/>
+          <a:p>
+            <a:pPr algn="ctr"/>
+            <a:endParaRPr lang="es-CO"/>
+          </a:p>
+        </p:txBody>
+      </p:sp>
+      <p:sp>
+        <p:nvSpPr>
+          <p:cNvPr id="41" name="Rectángulo 40"/>
+          <p:cNvSpPr/>
+          <p:nvPr/>
+        </p:nvSpPr>
+        <p:spPr>
+          <a:xfrm>
+            <a:off x="7332653" y="5791434"/>
+            <a:ext cx="396000" cy="396000"/>
+          </a:xfrm>
+          <a:prstGeom prst="rect">
+            <a:avLst/>
+          </a:prstGeom>
+          <a:solidFill>
+            <a:srgbClr val="FF6600"/>
+          </a:solidFill>
+          <a:ln w="28575">
+            <a:solidFill>
+              <a:schemeClr val="tx1"/>
+            </a:solidFill>
+          </a:ln>
+        </p:spPr>
+        <p:style>
+          <a:lnRef idx="2">
+            <a:schemeClr val="accent4">
+              <a:shade val="50000"/>
+            </a:schemeClr>
+          </a:lnRef>
+          <a:fillRef idx="1">
+            <a:schemeClr val="accent4"/>
+          </a:fillRef>
+          <a:effectRef idx="0">
+            <a:schemeClr val="accent4"/>
+          </a:effectRef>
+          <a:fontRef idx="minor">
+            <a:schemeClr val="lt1"/>
+          </a:fontRef>
+        </p:style>
+        <p:txBody>
+          <a:bodyPr rtlCol="0" anchor="ctr"/>
+          <a:lstStyle/>
+          <a:p>
+            <a:pPr algn="ctr"/>
+            <a:endParaRPr lang="es-CO" sz="900" dirty="0">
+              <a:latin typeface="Arial Black" panose="020B0A04020102020204" pitchFamily="34" charset="0"/>
+            </a:endParaRPr>
+          </a:p>
+        </p:txBody>
+      </p:sp>
+      <p:pic>
+        <p:nvPicPr>
+          <p:cNvPr id="20" name="Picture 4" descr="Resultado de imagen para tool png icon"/>
+          <p:cNvPicPr>
+            <a:picLocks noChangeAspect="1" noChangeArrowheads="1"/>
+          </p:cNvPicPr>
+          <p:nvPr/>
+        </p:nvPicPr>
+        <p:blipFill>
+          <a:blip r:embed="rId24" cstate="print">
+            <a:extLst>
+              <a:ext uri="{28A0092B-C50C-407E-A947-70E740481C1C}">
+                <a14:useLocalDpi xmlns:a14="http://schemas.microsoft.com/office/drawing/2010/main" val="0"/>
+              </a:ext>
+            </a:extLst>
+          </a:blip>
+          <a:srcRect/>
+          <a:stretch>
+            <a:fillRect/>
+          </a:stretch>
+        </p:blipFill>
+        <p:spPr bwMode="auto">
+          <a:xfrm flipH="1">
+            <a:off x="7345092" y="5807901"/>
+            <a:ext cx="360696" cy="360696"/>
+          </a:xfrm>
+          <a:prstGeom prst="rect">
+            <a:avLst/>
+          </a:prstGeom>
+          <a:noFill/>
+          <a:extLst>
+            <a:ext uri="{909E8E84-426E-40DD-AFC4-6F175D3DCCD1}">
+              <a14:hiddenFill xmlns:a14="http://schemas.microsoft.com/office/drawing/2010/main">
+                <a:solidFill>
+                  <a:srgbClr val="FFFFFF"/>
+                </a:solidFill>
+              </a14:hiddenFill>
+            </a:ext>
+          </a:extLst>
+        </p:spPr>
+      </p:pic>
     </p:spTree>
     <p:extLst>
       <p:ext uri="{BB962C8B-B14F-4D97-AF65-F5344CB8AC3E}">
@@ -5715,6 +6117,142 @@
 </file>
 
 <file path=ppt/slides/slide5.xml><?xml version="1.0" encoding="utf-8"?>
+<p:sld xmlns:a="http://schemas.openxmlformats.org/drawingml/2006/main" xmlns:r="http://schemas.openxmlformats.org/officeDocument/2006/relationships" xmlns:p="http://schemas.openxmlformats.org/presentationml/2006/main">
+  <p:cSld>
+    <p:bg>
+      <p:bgPr>
+        <a:solidFill>
+          <a:srgbClr val="EFEBE7"/>
+        </a:solidFill>
+        <a:effectLst/>
+      </p:bgPr>
+    </p:bg>
+    <p:spTree>
+      <p:nvGrpSpPr>
+        <p:cNvPr id="1" name=""/>
+        <p:cNvGrpSpPr/>
+        <p:nvPr/>
+      </p:nvGrpSpPr>
+      <p:grpSpPr>
+        <a:xfrm>
+          <a:off x="0" y="0"/>
+          <a:ext cx="0" cy="0"/>
+          <a:chOff x="0" y="0"/>
+          <a:chExt cx="0" cy="0"/>
+        </a:xfrm>
+      </p:grpSpPr>
+      <p:sp>
+        <p:nvSpPr>
+          <p:cNvPr id="41" name="Rectángulo 40"/>
+          <p:cNvSpPr/>
+          <p:nvPr/>
+        </p:nvSpPr>
+        <p:spPr>
+          <a:xfrm>
+            <a:off x="979979" y="738170"/>
+            <a:ext cx="1394253" cy="1394253"/>
+          </a:xfrm>
+          <a:prstGeom prst="rect">
+            <a:avLst/>
+          </a:prstGeom>
+          <a:solidFill>
+            <a:srgbClr val="FF6600"/>
+          </a:solidFill>
+          <a:ln w="28575">
+            <a:solidFill>
+              <a:schemeClr val="tx1"/>
+            </a:solidFill>
+          </a:ln>
+        </p:spPr>
+        <p:style>
+          <a:lnRef idx="2">
+            <a:schemeClr val="accent4">
+              <a:shade val="50000"/>
+            </a:schemeClr>
+          </a:lnRef>
+          <a:fillRef idx="1">
+            <a:schemeClr val="accent4"/>
+          </a:fillRef>
+          <a:effectRef idx="0">
+            <a:schemeClr val="accent4"/>
+          </a:effectRef>
+          <a:fontRef idx="minor">
+            <a:schemeClr val="lt1"/>
+          </a:fontRef>
+        </p:style>
+        <p:txBody>
+          <a:bodyPr rtlCol="0" anchor="ctr"/>
+          <a:lstStyle/>
+          <a:p>
+            <a:pPr algn="ctr"/>
+            <a:endParaRPr lang="es-CO" sz="900" dirty="0">
+              <a:latin typeface="Arial Black" panose="020B0A04020102020204" pitchFamily="34" charset="0"/>
+            </a:endParaRPr>
+          </a:p>
+        </p:txBody>
+      </p:sp>
+      <p:pic>
+        <p:nvPicPr>
+          <p:cNvPr id="20" name="Picture 4" descr="Resultado de imagen para tool png icon"/>
+          <p:cNvPicPr>
+            <a:picLocks noChangeAspect="1" noChangeArrowheads="1"/>
+          </p:cNvPicPr>
+          <p:nvPr/>
+        </p:nvPicPr>
+        <p:blipFill>
+          <a:blip r:embed="rId2" cstate="print">
+            <a:extLst>
+              <a:ext uri="{28A0092B-C50C-407E-A947-70E740481C1C}">
+                <a14:useLocalDpi xmlns:a14="http://schemas.microsoft.com/office/drawing/2010/main" val="0"/>
+              </a:ext>
+            </a:extLst>
+          </a:blip>
+          <a:srcRect/>
+          <a:stretch>
+            <a:fillRect/>
+          </a:stretch>
+        </p:blipFill>
+        <p:spPr bwMode="auto">
+          <a:xfrm flipH="1">
+            <a:off x="1044030" y="802221"/>
+            <a:ext cx="1266149" cy="1266149"/>
+          </a:xfrm>
+          <a:prstGeom prst="rect">
+            <a:avLst/>
+          </a:prstGeom>
+          <a:noFill/>
+          <a:extLst>
+            <a:ext uri="{909E8E84-426E-40DD-AFC4-6F175D3DCCD1}">
+              <a14:hiddenFill xmlns:a14="http://schemas.microsoft.com/office/drawing/2010/main">
+                <a:solidFill>
+                  <a:srgbClr val="FFFFFF"/>
+                </a:solidFill>
+              </a14:hiddenFill>
+            </a:ext>
+          </a:extLst>
+        </p:spPr>
+      </p:pic>
+    </p:spTree>
+    <p:extLst>
+      <p:ext uri="{BB962C8B-B14F-4D97-AF65-F5344CB8AC3E}">
+        <p14:creationId xmlns:p14="http://schemas.microsoft.com/office/powerpoint/2010/main" val="1803476278"/>
+      </p:ext>
+    </p:extLst>
+  </p:cSld>
+  <p:clrMapOvr>
+    <a:masterClrMapping/>
+  </p:clrMapOvr>
+  <p:timing>
+    <p:tnLst>
+      <p:par>
+        <p:cTn id="1" dur="indefinite" restart="never" nodeType="tmRoot"/>
+      </p:par>
+    </p:tnLst>
+  </p:timing>
+</p:sld>
+</file>
+
+<file path=ppt/slides/slide6.xml><?xml version="1.0" encoding="utf-8"?>
 <p:sld xmlns:a="http://schemas.openxmlformats.org/drawingml/2006/main" xmlns:r="http://schemas.openxmlformats.org/officeDocument/2006/relationships" xmlns:p="http://schemas.openxmlformats.org/presentationml/2006/main">
   <p:cSld>
     <p:spTree>
@@ -6272,7 +6810,7 @@
 </p:sld>
 </file>
 
-<file path=ppt/slides/slide6.xml><?xml version="1.0" encoding="utf-8"?>
+<file path=ppt/slides/slide7.xml><?xml version="1.0" encoding="utf-8"?>
 <p:sld xmlns:a="http://schemas.openxmlformats.org/drawingml/2006/main" xmlns:r="http://schemas.openxmlformats.org/officeDocument/2006/relationships" xmlns:p="http://schemas.openxmlformats.org/presentationml/2006/main">
   <p:cSld>
     <p:spTree>
@@ -6446,7 +6984,7 @@
 </p:sld>
 </file>
 
-<file path=ppt/slides/slide7.xml><?xml version="1.0" encoding="utf-8"?>
+<file path=ppt/slides/slide8.xml><?xml version="1.0" encoding="utf-8"?>
 <p:sld xmlns:a="http://schemas.openxmlformats.org/drawingml/2006/main" xmlns:r="http://schemas.openxmlformats.org/officeDocument/2006/relationships" xmlns:p="http://schemas.openxmlformats.org/presentationml/2006/main">
   <p:cSld>
     <p:bg>
@@ -6633,7 +7171,7 @@
 </p:sld>
 </file>
 
-<file path=ppt/slides/slide8.xml><?xml version="1.0" encoding="utf-8"?>
+<file path=ppt/slides/slide9.xml><?xml version="1.0" encoding="utf-8"?>
 <p:sld xmlns:a="http://schemas.openxmlformats.org/drawingml/2006/main" xmlns:r="http://schemas.openxmlformats.org/officeDocument/2006/relationships" xmlns:p="http://schemas.openxmlformats.org/presentationml/2006/main">
   <p:cSld>
     <p:bg>

</xml_diff>

<commit_message>
Control de caja y ajuste para evitar ruido de alarmas
</commit_message>
<xml_diff>
--- a/doc/designs.pptx
+++ b/doc/designs.pptx
@@ -251,7 +251,7 @@
           <a:p>
             <a:fld id="{E7A5C674-113B-41BE-9C1B-98B312858AB3}" type="datetimeFigureOut">
               <a:rPr lang="es-CO" smtClean="0"/>
-              <a:t>14/02/2018</a:t>
+              <a:t>18/02/2018</a:t>
             </a:fld>
             <a:endParaRPr lang="es-CO"/>
           </a:p>
@@ -421,7 +421,7 @@
           <a:p>
             <a:fld id="{E7A5C674-113B-41BE-9C1B-98B312858AB3}" type="datetimeFigureOut">
               <a:rPr lang="es-CO" smtClean="0"/>
-              <a:t>14/02/2018</a:t>
+              <a:t>18/02/2018</a:t>
             </a:fld>
             <a:endParaRPr lang="es-CO"/>
           </a:p>
@@ -601,7 +601,7 @@
           <a:p>
             <a:fld id="{E7A5C674-113B-41BE-9C1B-98B312858AB3}" type="datetimeFigureOut">
               <a:rPr lang="es-CO" smtClean="0"/>
-              <a:t>14/02/2018</a:t>
+              <a:t>18/02/2018</a:t>
             </a:fld>
             <a:endParaRPr lang="es-CO"/>
           </a:p>
@@ -771,7 +771,7 @@
           <a:p>
             <a:fld id="{E7A5C674-113B-41BE-9C1B-98B312858AB3}" type="datetimeFigureOut">
               <a:rPr lang="es-CO" smtClean="0"/>
-              <a:t>14/02/2018</a:t>
+              <a:t>18/02/2018</a:t>
             </a:fld>
             <a:endParaRPr lang="es-CO"/>
           </a:p>
@@ -1017,7 +1017,7 @@
           <a:p>
             <a:fld id="{E7A5C674-113B-41BE-9C1B-98B312858AB3}" type="datetimeFigureOut">
               <a:rPr lang="es-CO" smtClean="0"/>
-              <a:t>14/02/2018</a:t>
+              <a:t>18/02/2018</a:t>
             </a:fld>
             <a:endParaRPr lang="es-CO"/>
           </a:p>
@@ -1249,7 +1249,7 @@
           <a:p>
             <a:fld id="{E7A5C674-113B-41BE-9C1B-98B312858AB3}" type="datetimeFigureOut">
               <a:rPr lang="es-CO" smtClean="0"/>
-              <a:t>14/02/2018</a:t>
+              <a:t>18/02/2018</a:t>
             </a:fld>
             <a:endParaRPr lang="es-CO"/>
           </a:p>
@@ -1616,7 +1616,7 @@
           <a:p>
             <a:fld id="{E7A5C674-113B-41BE-9C1B-98B312858AB3}" type="datetimeFigureOut">
               <a:rPr lang="es-CO" smtClean="0"/>
-              <a:t>14/02/2018</a:t>
+              <a:t>18/02/2018</a:t>
             </a:fld>
             <a:endParaRPr lang="es-CO"/>
           </a:p>
@@ -1734,7 +1734,7 @@
           <a:p>
             <a:fld id="{E7A5C674-113B-41BE-9C1B-98B312858AB3}" type="datetimeFigureOut">
               <a:rPr lang="es-CO" smtClean="0"/>
-              <a:t>14/02/2018</a:t>
+              <a:t>18/02/2018</a:t>
             </a:fld>
             <a:endParaRPr lang="es-CO"/>
           </a:p>
@@ -1829,7 +1829,7 @@
           <a:p>
             <a:fld id="{E7A5C674-113B-41BE-9C1B-98B312858AB3}" type="datetimeFigureOut">
               <a:rPr lang="es-CO" smtClean="0"/>
-              <a:t>14/02/2018</a:t>
+              <a:t>18/02/2018</a:t>
             </a:fld>
             <a:endParaRPr lang="es-CO"/>
           </a:p>
@@ -2106,7 +2106,7 @@
           <a:p>
             <a:fld id="{E7A5C674-113B-41BE-9C1B-98B312858AB3}" type="datetimeFigureOut">
               <a:rPr lang="es-CO" smtClean="0"/>
-              <a:t>14/02/2018</a:t>
+              <a:t>18/02/2018</a:t>
             </a:fld>
             <a:endParaRPr lang="es-CO"/>
           </a:p>
@@ -2359,7 +2359,7 @@
           <a:p>
             <a:fld id="{E7A5C674-113B-41BE-9C1B-98B312858AB3}" type="datetimeFigureOut">
               <a:rPr lang="es-CO" smtClean="0"/>
-              <a:t>14/02/2018</a:t>
+              <a:t>18/02/2018</a:t>
             </a:fld>
             <a:endParaRPr lang="es-CO"/>
           </a:p>
@@ -2572,7 +2572,7 @@
           <a:p>
             <a:fld id="{E7A5C674-113B-41BE-9C1B-98B312858AB3}" type="datetimeFigureOut">
               <a:rPr lang="es-CO" smtClean="0"/>
-              <a:t>14/02/2018</a:t>
+              <a:t>18/02/2018</a:t>
             </a:fld>
             <a:endParaRPr lang="es-CO"/>
           </a:p>
@@ -6096,6 +6096,135 @@
           </a:extLst>
         </p:spPr>
       </p:pic>
+      <p:sp>
+        <p:nvSpPr>
+          <p:cNvPr id="44" name="Rectángulo 43"/>
+          <p:cNvSpPr/>
+          <p:nvPr/>
+        </p:nvSpPr>
+        <p:spPr>
+          <a:xfrm>
+            <a:off x="5979690" y="4481713"/>
+            <a:ext cx="2062774" cy="396338"/>
+          </a:xfrm>
+          <a:prstGeom prst="rect">
+            <a:avLst/>
+          </a:prstGeom>
+          <a:solidFill>
+            <a:schemeClr val="tx1"/>
+          </a:solidFill>
+          <a:ln w="28575">
+            <a:solidFill>
+              <a:schemeClr val="bg1"/>
+            </a:solidFill>
+          </a:ln>
+        </p:spPr>
+        <p:style>
+          <a:lnRef idx="2">
+            <a:schemeClr val="accent4">
+              <a:shade val="50000"/>
+            </a:schemeClr>
+          </a:lnRef>
+          <a:fillRef idx="1">
+            <a:schemeClr val="accent4"/>
+          </a:fillRef>
+          <a:effectRef idx="0">
+            <a:schemeClr val="accent4"/>
+          </a:effectRef>
+          <a:fontRef idx="minor">
+            <a:schemeClr val="lt1"/>
+          </a:fontRef>
+        </p:style>
+        <p:txBody>
+          <a:bodyPr rtlCol="0" anchor="ctr"/>
+          <a:lstStyle/>
+          <a:p>
+            <a:pPr algn="ctr"/>
+            <a:endParaRPr lang="es-CO" sz="900" dirty="0">
+              <a:latin typeface="Arial Black" panose="020B0A04020102020204" pitchFamily="34" charset="0"/>
+            </a:endParaRPr>
+          </a:p>
+        </p:txBody>
+      </p:sp>
+      <p:sp>
+        <p:nvSpPr>
+          <p:cNvPr id="46" name="CuadroTexto 45"/>
+          <p:cNvSpPr txBox="1"/>
+          <p:nvPr/>
+        </p:nvSpPr>
+        <p:spPr>
+          <a:xfrm>
+            <a:off x="6004437" y="4510605"/>
+            <a:ext cx="2029015" cy="338554"/>
+          </a:xfrm>
+          <a:prstGeom prst="rect">
+            <a:avLst/>
+          </a:prstGeom>
+          <a:noFill/>
+        </p:spPr>
+        <p:txBody>
+          <a:bodyPr wrap="square" rtlCol="0">
+            <a:spAutoFit/>
+          </a:bodyPr>
+          <a:lstStyle/>
+          <a:p>
+            <a:r>
+              <a:rPr lang="es-CO" sz="1600" b="1" dirty="0" smtClean="0">
+                <a:solidFill>
+                  <a:schemeClr val="bg1"/>
+                </a:solidFill>
+              </a:rPr>
+              <a:t>FIN MANTENIMIENTO</a:t>
+            </a:r>
+            <a:endParaRPr lang="es-CO" sz="1600" b="1" dirty="0">
+              <a:solidFill>
+                <a:schemeClr val="bg1"/>
+              </a:solidFill>
+            </a:endParaRPr>
+          </a:p>
+        </p:txBody>
+      </p:sp>
+      <p:pic>
+        <p:nvPicPr>
+          <p:cNvPr id="47" name="Picture 4" descr="Resultado de imagen para tool png icon"/>
+          <p:cNvPicPr>
+            <a:picLocks noChangeAspect="1" noChangeArrowheads="1"/>
+          </p:cNvPicPr>
+          <p:nvPr/>
+        </p:nvPicPr>
+        <p:blipFill>
+          <a:blip r:embed="rId25" cstate="print">
+            <a:extLst>
+              <a:ext uri="{28A0092B-C50C-407E-A947-70E740481C1C}">
+                <a14:useLocalDpi xmlns:a14="http://schemas.microsoft.com/office/drawing/2010/main" val="0"/>
+              </a:ext>
+            </a:extLst>
+          </a:blip>
+          <a:srcRect/>
+          <a:stretch>
+            <a:fillRect/>
+          </a:stretch>
+        </p:blipFill>
+        <p:spPr bwMode="auto">
+          <a:xfrm flipH="1">
+            <a:off x="3724889" y="4394261"/>
+            <a:ext cx="1266149" cy="1266149"/>
+          </a:xfrm>
+          <a:prstGeom prst="rect">
+            <a:avLst/>
+          </a:prstGeom>
+          <a:noFill/>
+          <a:extLst>
+            <a:ext uri="{909E8E84-426E-40DD-AFC4-6F175D3DCCD1}">
+              <a14:hiddenFill xmlns:a14="http://schemas.microsoft.com/office/drawing/2010/main">
+                <a:solidFill>
+                  <a:srgbClr val="FFFFFF"/>
+                </a:solidFill>
+              </a14:hiddenFill>
+            </a:ext>
+          </a:extLst>
+        </p:spPr>
+      </p:pic>
     </p:spTree>
     <p:extLst>
       <p:ext uri="{BB962C8B-B14F-4D97-AF65-F5344CB8AC3E}">
@@ -6232,6 +6361,174 @@
           </a:extLst>
         </p:spPr>
       </p:pic>
+      <p:sp>
+        <p:nvSpPr>
+          <p:cNvPr id="2" name="Rectángulo 1"/>
+          <p:cNvSpPr/>
+          <p:nvPr/>
+        </p:nvSpPr>
+        <p:spPr>
+          <a:xfrm>
+            <a:off x="1677105" y="3383281"/>
+            <a:ext cx="1954369" cy="365759"/>
+          </a:xfrm>
+          <a:prstGeom prst="rect">
+            <a:avLst/>
+          </a:prstGeom>
+          <a:solidFill>
+            <a:schemeClr val="accent1">
+              <a:lumMod val="50000"/>
+            </a:schemeClr>
+          </a:solidFill>
+          <a:ln w="38100">
+            <a:solidFill>
+              <a:schemeClr val="accent1">
+                <a:lumMod val="75000"/>
+              </a:schemeClr>
+            </a:solidFill>
+          </a:ln>
+        </p:spPr>
+        <p:style>
+          <a:lnRef idx="2">
+            <a:schemeClr val="accent1">
+              <a:shade val="50000"/>
+            </a:schemeClr>
+          </a:lnRef>
+          <a:fillRef idx="1">
+            <a:schemeClr val="accent1"/>
+          </a:fillRef>
+          <a:effectRef idx="0">
+            <a:schemeClr val="accent1"/>
+          </a:effectRef>
+          <a:fontRef idx="minor">
+            <a:schemeClr val="lt1"/>
+          </a:fontRef>
+        </p:style>
+        <p:txBody>
+          <a:bodyPr rtlCol="0" anchor="ctr"/>
+          <a:lstStyle/>
+          <a:p>
+            <a:pPr algn="ctr"/>
+            <a:r>
+              <a:rPr lang="es-CO" b="1" dirty="0" smtClean="0"/>
+              <a:t>INGRESOS</a:t>
+            </a:r>
+            <a:endParaRPr lang="es-CO" b="1" dirty="0"/>
+          </a:p>
+        </p:txBody>
+      </p:sp>
+      <p:sp>
+        <p:nvSpPr>
+          <p:cNvPr id="5" name="Rectángulo 4"/>
+          <p:cNvSpPr/>
+          <p:nvPr/>
+        </p:nvSpPr>
+        <p:spPr>
+          <a:xfrm>
+            <a:off x="1677103" y="3862636"/>
+            <a:ext cx="1954369" cy="365759"/>
+          </a:xfrm>
+          <a:prstGeom prst="rect">
+            <a:avLst/>
+          </a:prstGeom>
+          <a:solidFill>
+            <a:schemeClr val="accent1">
+              <a:lumMod val="50000"/>
+            </a:schemeClr>
+          </a:solidFill>
+          <a:ln w="38100">
+            <a:solidFill>
+              <a:schemeClr val="accent1">
+                <a:lumMod val="75000"/>
+              </a:schemeClr>
+            </a:solidFill>
+          </a:ln>
+        </p:spPr>
+        <p:style>
+          <a:lnRef idx="2">
+            <a:schemeClr val="accent1">
+              <a:shade val="50000"/>
+            </a:schemeClr>
+          </a:lnRef>
+          <a:fillRef idx="1">
+            <a:schemeClr val="accent1"/>
+          </a:fillRef>
+          <a:effectRef idx="0">
+            <a:schemeClr val="accent1"/>
+          </a:effectRef>
+          <a:fontRef idx="minor">
+            <a:schemeClr val="lt1"/>
+          </a:fontRef>
+        </p:style>
+        <p:txBody>
+          <a:bodyPr rtlCol="0" anchor="ctr"/>
+          <a:lstStyle/>
+          <a:p>
+            <a:pPr algn="ctr"/>
+            <a:r>
+              <a:rPr lang="es-CO" b="1" dirty="0" smtClean="0"/>
+              <a:t>RECAUDOS</a:t>
+            </a:r>
+            <a:endParaRPr lang="es-CO" b="1" dirty="0"/>
+          </a:p>
+        </p:txBody>
+      </p:sp>
+      <p:sp>
+        <p:nvSpPr>
+          <p:cNvPr id="6" name="Rectángulo 5"/>
+          <p:cNvSpPr/>
+          <p:nvPr/>
+        </p:nvSpPr>
+        <p:spPr>
+          <a:xfrm>
+            <a:off x="1677103" y="4341991"/>
+            <a:ext cx="1954369" cy="365759"/>
+          </a:xfrm>
+          <a:prstGeom prst="rect">
+            <a:avLst/>
+          </a:prstGeom>
+          <a:solidFill>
+            <a:schemeClr val="accent1">
+              <a:lumMod val="50000"/>
+            </a:schemeClr>
+          </a:solidFill>
+          <a:ln w="38100">
+            <a:solidFill>
+              <a:schemeClr val="accent1">
+                <a:lumMod val="75000"/>
+              </a:schemeClr>
+            </a:solidFill>
+          </a:ln>
+        </p:spPr>
+        <p:style>
+          <a:lnRef idx="2">
+            <a:schemeClr val="accent1">
+              <a:shade val="50000"/>
+            </a:schemeClr>
+          </a:lnRef>
+          <a:fillRef idx="1">
+            <a:schemeClr val="accent1"/>
+          </a:fillRef>
+          <a:effectRef idx="0">
+            <a:schemeClr val="accent1"/>
+          </a:effectRef>
+          <a:fontRef idx="minor">
+            <a:schemeClr val="lt1"/>
+          </a:fontRef>
+        </p:style>
+        <p:txBody>
+          <a:bodyPr rtlCol="0" anchor="ctr"/>
+          <a:lstStyle/>
+          <a:p>
+            <a:pPr algn="ctr"/>
+            <a:r>
+              <a:rPr lang="es-CO" b="1" dirty="0" smtClean="0"/>
+              <a:t>GASTOS</a:t>
+            </a:r>
+            <a:endParaRPr lang="es-CO" b="1" dirty="0"/>
+          </a:p>
+        </p:txBody>
+      </p:sp>
     </p:spTree>
     <p:extLst>
       <p:ext uri="{BB962C8B-B14F-4D97-AF65-F5344CB8AC3E}">

</xml_diff>